<commit_message>
added week 9 exerecise
</commit_message>
<xml_diff>
--- a/Term Paper/FInal.pptx
+++ b/Term Paper/FInal.pptx
@@ -128,7 +128,7 @@
 <file path=ppt/revisionInfo.xml><?xml version="1.0" encoding="utf-8"?>
 <p1510:revInfo xmlns:a="http://schemas.openxmlformats.org/drawingml/2006/main" xmlns:r="http://schemas.openxmlformats.org/officeDocument/2006/relationships" xmlns:p1510="http://schemas.microsoft.com/office/powerpoint/2015/10/main">
   <p1510:revLst>
-    <p1510:client id="{DD623DAF-52C5-4578-ABA6-302CE339A825}" v="4" dt="2024-03-15T21:45:30.495"/>
+    <p1510:client id="{DD623DAF-52C5-4578-ABA6-302CE339A825}" v="13" dt="2024-03-26T16:04:19.607"/>
   </p1510:revLst>
 </p1510:revInfo>
 </file>
@@ -138,7 +138,7 @@
   <pc:docChgLst>
     <pc:chgData name="Tyler Zenisek" userId="5687274592b78541" providerId="LiveId" clId="{DD623DAF-52C5-4578-ABA6-302CE339A825}"/>
     <pc:docChg chg="custSel addSld modSld sldOrd">
-      <pc:chgData name="Tyler Zenisek" userId="5687274592b78541" providerId="LiveId" clId="{DD623DAF-52C5-4578-ABA6-302CE339A825}" dt="2024-03-18T06:35:53.514" v="4839"/>
+      <pc:chgData name="Tyler Zenisek" userId="5687274592b78541" providerId="LiveId" clId="{DD623DAF-52C5-4578-ABA6-302CE339A825}" dt="2024-03-26T16:04:19.607" v="5100" actId="1076"/>
       <pc:docMkLst>
         <pc:docMk/>
       </pc:docMkLst>
@@ -342,12 +342,44 @@
           </ac:spMkLst>
         </pc:spChg>
       </pc:sldChg>
-      <pc:sldChg chg="new">
-        <pc:chgData name="Tyler Zenisek" userId="5687274592b78541" providerId="LiveId" clId="{DD623DAF-52C5-4578-ABA6-302CE339A825}" dt="2024-03-18T06:21:10.143" v="4354" actId="680"/>
+      <pc:sldChg chg="addSp modSp new mod">
+        <pc:chgData name="Tyler Zenisek" userId="5687274592b78541" providerId="LiveId" clId="{DD623DAF-52C5-4578-ABA6-302CE339A825}" dt="2024-03-26T16:04:19.607" v="5100" actId="1076"/>
         <pc:sldMkLst>
           <pc:docMk/>
           <pc:sldMk cId="787771816" sldId="266"/>
         </pc:sldMkLst>
+        <pc:spChg chg="mod">
+          <ac:chgData name="Tyler Zenisek" userId="5687274592b78541" providerId="LiveId" clId="{DD623DAF-52C5-4578-ABA6-302CE339A825}" dt="2024-03-26T16:00:14.282" v="4852" actId="20577"/>
+          <ac:spMkLst>
+            <pc:docMk/>
+            <pc:sldMk cId="787771816" sldId="266"/>
+            <ac:spMk id="2" creationId="{797BD2A7-10D7-15CB-9FC1-37866EF3B393}"/>
+          </ac:spMkLst>
+        </pc:spChg>
+        <pc:spChg chg="mod">
+          <ac:chgData name="Tyler Zenisek" userId="5687274592b78541" providerId="LiveId" clId="{DD623DAF-52C5-4578-ABA6-302CE339A825}" dt="2024-03-26T16:03:53.003" v="5096" actId="1076"/>
+          <ac:spMkLst>
+            <pc:docMk/>
+            <pc:sldMk cId="787771816" sldId="266"/>
+            <ac:spMk id="3" creationId="{D80801A9-74EC-F2C1-3ABE-85FF5AF446ED}"/>
+          </ac:spMkLst>
+        </pc:spChg>
+        <pc:picChg chg="add mod">
+          <ac:chgData name="Tyler Zenisek" userId="5687274592b78541" providerId="LiveId" clId="{DD623DAF-52C5-4578-ABA6-302CE339A825}" dt="2024-03-26T16:03:53.003" v="5096" actId="1076"/>
+          <ac:picMkLst>
+            <pc:docMk/>
+            <pc:sldMk cId="787771816" sldId="266"/>
+            <ac:picMk id="1026" creationId="{E55CF3DF-10C4-878B-BDD5-E863F0847191}"/>
+          </ac:picMkLst>
+        </pc:picChg>
+        <pc:picChg chg="add mod">
+          <ac:chgData name="Tyler Zenisek" userId="5687274592b78541" providerId="LiveId" clId="{DD623DAF-52C5-4578-ABA6-302CE339A825}" dt="2024-03-26T16:04:19.607" v="5100" actId="1076"/>
+          <ac:picMkLst>
+            <pc:docMk/>
+            <pc:sldMk cId="787771816" sldId="266"/>
+            <ac:picMk id="1028" creationId="{9184001B-8235-D22A-A745-6F9340F496E2}"/>
+          </ac:picMkLst>
+        </pc:picChg>
       </pc:sldChg>
       <pc:sldChg chg="modSp new mod ord">
         <pc:chgData name="Tyler Zenisek" userId="5687274592b78541" providerId="LiveId" clId="{DD623DAF-52C5-4578-ABA6-302CE339A825}" dt="2024-03-18T06:35:53.514" v="4839"/>
@@ -542,7 +574,7 @@
           <a:p>
             <a:fld id="{9D0D92BC-42A9-434B-8530-ADBF4485E407}" type="datetimeFigureOut">
               <a:rPr lang="en-US" smtClean="0"/>
-              <a:t>3/18/2024</a:t>
+              <a:t>3/26/2024</a:t>
             </a:fld>
             <a:endParaRPr lang="en-US"/>
           </a:p>
@@ -793,7 +825,7 @@
           <a:p>
             <a:fld id="{9D0D92BC-42A9-434B-8530-ADBF4485E407}" type="datetimeFigureOut">
               <a:rPr lang="en-US" smtClean="0"/>
-              <a:t>3/18/2024</a:t>
+              <a:t>3/26/2024</a:t>
             </a:fld>
             <a:endParaRPr lang="en-US"/>
           </a:p>
@@ -1001,7 +1033,7 @@
           <a:p>
             <a:fld id="{9D0D92BC-42A9-434B-8530-ADBF4485E407}" type="datetimeFigureOut">
               <a:rPr lang="en-US" smtClean="0"/>
-              <a:t>3/18/2024</a:t>
+              <a:t>3/26/2024</a:t>
             </a:fld>
             <a:endParaRPr lang="en-US"/>
           </a:p>
@@ -1199,7 +1231,7 @@
           <a:p>
             <a:fld id="{9D0D92BC-42A9-434B-8530-ADBF4485E407}" type="datetimeFigureOut">
               <a:rPr lang="en-US" smtClean="0"/>
-              <a:t>3/18/2024</a:t>
+              <a:t>3/26/2024</a:t>
             </a:fld>
             <a:endParaRPr lang="en-US"/>
           </a:p>
@@ -1479,7 +1511,7 @@
           <a:p>
             <a:fld id="{9D0D92BC-42A9-434B-8530-ADBF4485E407}" type="datetimeFigureOut">
               <a:rPr lang="en-US" smtClean="0"/>
-              <a:t>3/18/2024</a:t>
+              <a:t>3/26/2024</a:t>
             </a:fld>
             <a:endParaRPr lang="en-US"/>
           </a:p>
@@ -1787,7 +1819,7 @@
           <a:p>
             <a:fld id="{9D0D92BC-42A9-434B-8530-ADBF4485E407}" type="datetimeFigureOut">
               <a:rPr lang="en-US" smtClean="0"/>
-              <a:t>3/18/2024</a:t>
+              <a:t>3/26/2024</a:t>
             </a:fld>
             <a:endParaRPr lang="en-US"/>
           </a:p>
@@ -2207,7 +2239,7 @@
           <a:p>
             <a:fld id="{9D0D92BC-42A9-434B-8530-ADBF4485E407}" type="datetimeFigureOut">
               <a:rPr lang="en-US" smtClean="0"/>
-              <a:t>3/18/2024</a:t>
+              <a:t>3/26/2024</a:t>
             </a:fld>
             <a:endParaRPr lang="en-US"/>
           </a:p>
@@ -2439,7 +2471,7 @@
           <a:p>
             <a:fld id="{9D0D92BC-42A9-434B-8530-ADBF4485E407}" type="datetimeFigureOut">
               <a:rPr lang="en-US" smtClean="0"/>
-              <a:t>3/18/2024</a:t>
+              <a:t>3/26/2024</a:t>
             </a:fld>
             <a:endParaRPr lang="en-US"/>
           </a:p>
@@ -2552,7 +2584,7 @@
           <a:p>
             <a:fld id="{9D0D92BC-42A9-434B-8530-ADBF4485E407}" type="datetimeFigureOut">
               <a:rPr lang="en-US" smtClean="0"/>
-              <a:t>3/18/2024</a:t>
+              <a:t>3/26/2024</a:t>
             </a:fld>
             <a:endParaRPr lang="en-US"/>
           </a:p>
@@ -2869,7 +2901,7 @@
           <a:p>
             <a:fld id="{9D0D92BC-42A9-434B-8530-ADBF4485E407}" type="datetimeFigureOut">
               <a:rPr lang="en-US" smtClean="0"/>
-              <a:t>3/18/2024</a:t>
+              <a:t>3/26/2024</a:t>
             </a:fld>
             <a:endParaRPr lang="en-US"/>
           </a:p>
@@ -3161,7 +3193,7 @@
           <a:p>
             <a:fld id="{9D0D92BC-42A9-434B-8530-ADBF4485E407}" type="datetimeFigureOut">
               <a:rPr lang="en-US" smtClean="0"/>
-              <a:t>3/18/2024</a:t>
+              <a:t>3/26/2024</a:t>
             </a:fld>
             <a:endParaRPr lang="en-US"/>
           </a:p>
@@ -3468,7 +3500,7 @@
             <a:fld id="{9D0D92BC-42A9-434B-8530-ADBF4485E407}" type="datetimeFigureOut">
               <a:rPr lang="en-US" smtClean="0"/>
               <a:pPr/>
-              <a:t>3/18/2024</a:t>
+              <a:t>3/26/2024</a:t>
             </a:fld>
             <a:endParaRPr lang="en-US" dirty="0"/>
           </a:p>
@@ -4564,7 +4596,11 @@
           <a:bodyPr/>
           <a:lstStyle/>
           <a:p>
-            <a:endParaRPr lang="en-US"/>
+            <a:pPr algn="ctr"/>
+            <a:r>
+              <a:rPr lang="en-US" dirty="0"/>
+              <a:t>Java Support</a:t>
+            </a:r>
           </a:p>
         </p:txBody>
       </p:sp>
@@ -4584,15 +4620,170 @@
             <p:ph idx="1"/>
           </p:nvPr>
         </p:nvSpPr>
-        <p:spPr/>
-        <p:txBody>
-          <a:bodyPr/>
-          <a:lstStyle/>
-          <a:p>
-            <a:endParaRPr lang="en-US"/>
-          </a:p>
-        </p:txBody>
-      </p:sp>
+        <p:spPr>
+          <a:xfrm>
+            <a:off x="952499" y="2209797"/>
+            <a:ext cx="10287000" cy="3890965"/>
+          </a:xfrm>
+        </p:spPr>
+        <p:txBody>
+          <a:bodyPr/>
+          <a:lstStyle/>
+          <a:p>
+            <a:r>
+              <a:rPr lang="en-US" dirty="0"/>
+              <a:t>Spring Boot</a:t>
+            </a:r>
+          </a:p>
+          <a:p>
+            <a:pPr marL="541782" lvl="1" indent="-285750">
+              <a:buFontTx/>
+              <a:buChar char="-"/>
+            </a:pPr>
+            <a:r>
+              <a:rPr lang="en-US" dirty="0"/>
+              <a:t>Servers</a:t>
+            </a:r>
+          </a:p>
+          <a:p>
+            <a:pPr marL="541782" lvl="1" indent="-285750">
+              <a:buFontTx/>
+              <a:buChar char="-"/>
+            </a:pPr>
+            <a:r>
+              <a:rPr lang="en-US" dirty="0"/>
+              <a:t>Web Development</a:t>
+            </a:r>
+          </a:p>
+          <a:p>
+            <a:pPr marL="541782" lvl="1" indent="-285750">
+              <a:buFontTx/>
+              <a:buChar char="-"/>
+            </a:pPr>
+            <a:r>
+              <a:rPr lang="en-US" dirty="0"/>
+              <a:t>Web Hosting</a:t>
+            </a:r>
+          </a:p>
+          <a:p>
+            <a:pPr marL="541782" lvl="1" indent="-285750">
+              <a:buFontTx/>
+              <a:buChar char="-"/>
+            </a:pPr>
+            <a:r>
+              <a:rPr lang="en-US" dirty="0"/>
+              <a:t>Microservices </a:t>
+            </a:r>
+          </a:p>
+          <a:p>
+            <a:r>
+              <a:rPr lang="en-US" dirty="0"/>
+              <a:t>Android Development with Android Studio</a:t>
+            </a:r>
+          </a:p>
+          <a:p>
+            <a:pPr lvl="1"/>
+            <a:r>
+              <a:rPr lang="en-US" dirty="0"/>
+              <a:t>- Android App Development front to mid end</a:t>
+            </a:r>
+          </a:p>
+        </p:txBody>
+      </p:sp>
+      <p:pic>
+        <p:nvPicPr>
+          <p:cNvPr id="1026" name="Picture 2" descr="Getting Started with Spring Boot. Spring boot is an app development… | by  Tosin Adedoyin | Medium">
+            <a:extLst>
+              <a:ext uri="{FF2B5EF4-FFF2-40B4-BE49-F238E27FC236}">
+                <a16:creationId xmlns:a16="http://schemas.microsoft.com/office/drawing/2014/main" id="{E55CF3DF-10C4-878B-BDD5-E863F0847191}"/>
+              </a:ext>
+            </a:extLst>
+          </p:cNvPr>
+          <p:cNvPicPr>
+            <a:picLocks noChangeAspect="1" noChangeArrowheads="1"/>
+          </p:cNvPicPr>
+          <p:nvPr/>
+        </p:nvPicPr>
+        <p:blipFill>
+          <a:blip r:embed="rId2">
+            <a:extLst>
+              <a:ext uri="{28A0092B-C50C-407E-A947-70E740481C1C}">
+                <a14:useLocalDpi xmlns:a14="http://schemas.microsoft.com/office/drawing/2010/main" val="0"/>
+              </a:ext>
+            </a:extLst>
+          </a:blip>
+          <a:srcRect/>
+          <a:stretch>
+            <a:fillRect/>
+          </a:stretch>
+        </p:blipFill>
+        <p:spPr bwMode="auto">
+          <a:xfrm>
+            <a:off x="4462462" y="2652713"/>
+            <a:ext cx="3267075" cy="1400175"/>
+          </a:xfrm>
+          <a:prstGeom prst="rect">
+            <a:avLst/>
+          </a:prstGeom>
+          <a:noFill/>
+          <a:extLst>
+            <a:ext uri="{909E8E84-426E-40DD-AFC4-6F175D3DCCD1}">
+              <a14:hiddenFill xmlns:a14="http://schemas.microsoft.com/office/drawing/2010/main">
+                <a:solidFill>
+                  <a:srgbClr val="FFFFFF"/>
+                </a:solidFill>
+              </a14:hiddenFill>
+            </a:ext>
+          </a:extLst>
+        </p:spPr>
+      </p:pic>
+      <p:pic>
+        <p:nvPicPr>
+          <p:cNvPr id="1028" name="Picture 4" descr="2023's Top-Ranked Android Development IDEs and Tools | The Best IDEs">
+            <a:extLst>
+              <a:ext uri="{FF2B5EF4-FFF2-40B4-BE49-F238E27FC236}">
+                <a16:creationId xmlns:a16="http://schemas.microsoft.com/office/drawing/2014/main" id="{9184001B-8235-D22A-A745-6F9340F496E2}"/>
+              </a:ext>
+            </a:extLst>
+          </p:cNvPr>
+          <p:cNvPicPr>
+            <a:picLocks noChangeAspect="1" noChangeArrowheads="1"/>
+          </p:cNvPicPr>
+          <p:nvPr/>
+        </p:nvPicPr>
+        <p:blipFill>
+          <a:blip r:embed="rId3">
+            <a:extLst>
+              <a:ext uri="{28A0092B-C50C-407E-A947-70E740481C1C}">
+                <a14:useLocalDpi xmlns:a14="http://schemas.microsoft.com/office/drawing/2010/main" val="0"/>
+              </a:ext>
+            </a:extLst>
+          </a:blip>
+          <a:srcRect/>
+          <a:stretch>
+            <a:fillRect/>
+          </a:stretch>
+        </p:blipFill>
+        <p:spPr bwMode="auto">
+          <a:xfrm>
+            <a:off x="6483241" y="3914450"/>
+            <a:ext cx="4521091" cy="2629228"/>
+          </a:xfrm>
+          <a:prstGeom prst="rect">
+            <a:avLst/>
+          </a:prstGeom>
+          <a:noFill/>
+          <a:extLst>
+            <a:ext uri="{909E8E84-426E-40DD-AFC4-6F175D3DCCD1}">
+              <a14:hiddenFill xmlns:a14="http://schemas.microsoft.com/office/drawing/2010/main">
+                <a:solidFill>
+                  <a:srgbClr val="FFFFFF"/>
+                </a:solidFill>
+              </a14:hiddenFill>
+            </a:ext>
+          </a:extLst>
+        </p:spPr>
+      </p:pic>
     </p:spTree>
     <p:extLst>
       <p:ext uri="{BB962C8B-B14F-4D97-AF65-F5344CB8AC3E}">

</xml_diff>